<commit_message>
Se realiza formulario de solicitud de credito
</commit_message>
<xml_diff>
--- a/Documentacion/GeneradorOpciones.pptx
+++ b/Documentacion/GeneradorOpciones.pptx
@@ -13,6 +13,7 @@
     <p:sldId id="262" r:id="rId7"/>
     <p:sldId id="263" r:id="rId8"/>
     <p:sldId id="264" r:id="rId9"/>
+    <p:sldId id="265" r:id="rId10"/>
   </p:sldIdLst>
   <p:sldSz cx="12192000" cy="6858000"/>
   <p:notesSz cx="6858000" cy="9144000"/>
@@ -250,7 +251,7 @@
           <a:p>
             <a:fld id="{E5B10194-B428-4D68-B749-C4A17A9BBD1F}" type="datetimeFigureOut">
               <a:rPr lang="en-US" smtClean="0"/>
-              <a:t>5/25/2019</a:t>
+              <a:t>4/15/2020</a:t>
             </a:fld>
             <a:endParaRPr lang="en-US"/>
           </a:p>
@@ -420,7 +421,7 @@
           <a:p>
             <a:fld id="{E5B10194-B428-4D68-B749-C4A17A9BBD1F}" type="datetimeFigureOut">
               <a:rPr lang="en-US" smtClean="0"/>
-              <a:t>5/25/2019</a:t>
+              <a:t>4/15/2020</a:t>
             </a:fld>
             <a:endParaRPr lang="en-US"/>
           </a:p>
@@ -600,7 +601,7 @@
           <a:p>
             <a:fld id="{E5B10194-B428-4D68-B749-C4A17A9BBD1F}" type="datetimeFigureOut">
               <a:rPr lang="en-US" smtClean="0"/>
-              <a:t>5/25/2019</a:t>
+              <a:t>4/15/2020</a:t>
             </a:fld>
             <a:endParaRPr lang="en-US"/>
           </a:p>
@@ -770,7 +771,7 @@
           <a:p>
             <a:fld id="{E5B10194-B428-4D68-B749-C4A17A9BBD1F}" type="datetimeFigureOut">
               <a:rPr lang="en-US" smtClean="0"/>
-              <a:t>5/25/2019</a:t>
+              <a:t>4/15/2020</a:t>
             </a:fld>
             <a:endParaRPr lang="en-US"/>
           </a:p>
@@ -1016,7 +1017,7 @@
           <a:p>
             <a:fld id="{E5B10194-B428-4D68-B749-C4A17A9BBD1F}" type="datetimeFigureOut">
               <a:rPr lang="en-US" smtClean="0"/>
-              <a:t>5/25/2019</a:t>
+              <a:t>4/15/2020</a:t>
             </a:fld>
             <a:endParaRPr lang="en-US"/>
           </a:p>
@@ -1248,7 +1249,7 @@
           <a:p>
             <a:fld id="{E5B10194-B428-4D68-B749-C4A17A9BBD1F}" type="datetimeFigureOut">
               <a:rPr lang="en-US" smtClean="0"/>
-              <a:t>5/25/2019</a:t>
+              <a:t>4/15/2020</a:t>
             </a:fld>
             <a:endParaRPr lang="en-US"/>
           </a:p>
@@ -1615,7 +1616,7 @@
           <a:p>
             <a:fld id="{E5B10194-B428-4D68-B749-C4A17A9BBD1F}" type="datetimeFigureOut">
               <a:rPr lang="en-US" smtClean="0"/>
-              <a:t>5/25/2019</a:t>
+              <a:t>4/15/2020</a:t>
             </a:fld>
             <a:endParaRPr lang="en-US"/>
           </a:p>
@@ -1733,7 +1734,7 @@
           <a:p>
             <a:fld id="{E5B10194-B428-4D68-B749-C4A17A9BBD1F}" type="datetimeFigureOut">
               <a:rPr lang="en-US" smtClean="0"/>
-              <a:t>5/25/2019</a:t>
+              <a:t>4/15/2020</a:t>
             </a:fld>
             <a:endParaRPr lang="en-US"/>
           </a:p>
@@ -1828,7 +1829,7 @@
           <a:p>
             <a:fld id="{E5B10194-B428-4D68-B749-C4A17A9BBD1F}" type="datetimeFigureOut">
               <a:rPr lang="en-US" smtClean="0"/>
-              <a:t>5/25/2019</a:t>
+              <a:t>4/15/2020</a:t>
             </a:fld>
             <a:endParaRPr lang="en-US"/>
           </a:p>
@@ -2105,7 +2106,7 @@
           <a:p>
             <a:fld id="{E5B10194-B428-4D68-B749-C4A17A9BBD1F}" type="datetimeFigureOut">
               <a:rPr lang="en-US" smtClean="0"/>
-              <a:t>5/25/2019</a:t>
+              <a:t>4/15/2020</a:t>
             </a:fld>
             <a:endParaRPr lang="en-US"/>
           </a:p>
@@ -2358,7 +2359,7 @@
           <a:p>
             <a:fld id="{E5B10194-B428-4D68-B749-C4A17A9BBD1F}" type="datetimeFigureOut">
               <a:rPr lang="en-US" smtClean="0"/>
-              <a:t>5/25/2019</a:t>
+              <a:t>4/15/2020</a:t>
             </a:fld>
             <a:endParaRPr lang="en-US"/>
           </a:p>
@@ -2571,7 +2572,7 @@
           <a:p>
             <a:fld id="{E5B10194-B428-4D68-B749-C4A17A9BBD1F}" type="datetimeFigureOut">
               <a:rPr lang="en-US" smtClean="0"/>
-              <a:t>5/25/2019</a:t>
+              <a:t>4/15/2020</a:t>
             </a:fld>
             <a:endParaRPr lang="en-US"/>
           </a:p>
@@ -4125,6 +4126,166 @@
   <p:clrMapOvr>
     <a:masterClrMapping/>
   </p:clrMapOvr>
+  <p:timing>
+    <p:tnLst>
+      <p:par>
+        <p:cTn id="1" dur="indefinite" restart="never" nodeType="tmRoot"/>
+      </p:par>
+    </p:tnLst>
+  </p:timing>
+</p:sld>
+</file>
+
+<file path=ppt/slides/slide9.xml><?xml version="1.0" encoding="utf-8"?>
+<p:sld xmlns:a="http://schemas.openxmlformats.org/drawingml/2006/main" xmlns:r="http://schemas.openxmlformats.org/officeDocument/2006/relationships" xmlns:p="http://schemas.openxmlformats.org/presentationml/2006/main">
+  <p:cSld>
+    <p:bg>
+      <p:bgPr>
+        <a:solidFill>
+          <a:schemeClr val="bg1">
+            <a:lumMod val="95000"/>
+          </a:schemeClr>
+        </a:solidFill>
+        <a:effectLst/>
+      </p:bgPr>
+    </p:bg>
+    <p:spTree>
+      <p:nvGrpSpPr>
+        <p:cNvPr id="1" name=""/>
+        <p:cNvGrpSpPr/>
+        <p:nvPr/>
+      </p:nvGrpSpPr>
+      <p:grpSpPr>
+        <a:xfrm>
+          <a:off x="0" y="0"/>
+          <a:ext cx="0" cy="0"/>
+          <a:chOff x="0" y="0"/>
+          <a:chExt cx="0" cy="0"/>
+        </a:xfrm>
+      </p:grpSpPr>
+      <p:sp>
+        <p:nvSpPr>
+          <p:cNvPr id="5" name="Content Placeholder 4"/>
+          <p:cNvSpPr>
+            <a:spLocks noGrp="1"/>
+          </p:cNvSpPr>
+          <p:nvPr>
+            <p:ph idx="1"/>
+          </p:nvPr>
+        </p:nvSpPr>
+        <p:spPr>
+          <a:xfrm>
+            <a:off x="4472543" y="1433663"/>
+            <a:ext cx="7170540" cy="1601126"/>
+          </a:xfrm>
+        </p:spPr>
+        <p:txBody>
+          <a:bodyPr>
+            <a:normAutofit lnSpcReduction="10000"/>
+          </a:bodyPr>
+          <a:lstStyle/>
+          <a:p>
+            <a:pPr marL="0" indent="0" algn="ctr">
+              <a:buNone/>
+            </a:pPr>
+            <a:r>
+              <a:rPr lang="es-CO" sz="6000" dirty="0" smtClean="0">
+                <a:latin typeface="Arial" panose="020B0604020202020204" pitchFamily="34" charset="0"/>
+                <a:cs typeface="Arial" panose="020B0604020202020204" pitchFamily="34" charset="0"/>
+              </a:rPr>
+              <a:t>AMORTIZACIÓN DE CRÉDITO</a:t>
+            </a:r>
+            <a:endParaRPr lang="en-US" sz="6000" dirty="0">
+              <a:latin typeface="Arial" panose="020B0604020202020204" pitchFamily="34" charset="0"/>
+              <a:cs typeface="Arial" panose="020B0604020202020204" pitchFamily="34" charset="0"/>
+            </a:endParaRPr>
+          </a:p>
+        </p:txBody>
+      </p:sp>
+      <p:sp>
+        <p:nvSpPr>
+          <p:cNvPr id="6" name="Text Placeholder 5"/>
+          <p:cNvSpPr>
+            <a:spLocks noGrp="1"/>
+          </p:cNvSpPr>
+          <p:nvPr>
+            <p:ph type="body" sz="half" idx="2"/>
+          </p:nvPr>
+        </p:nvSpPr>
+        <p:spPr>
+          <a:xfrm>
+            <a:off x="534321" y="5168171"/>
+            <a:ext cx="4353544" cy="846822"/>
+          </a:xfrm>
+        </p:spPr>
+        <p:txBody>
+          <a:bodyPr>
+            <a:noAutofit/>
+          </a:bodyPr>
+          <a:lstStyle/>
+          <a:p>
+            <a:pPr algn="ctr"/>
+            <a:r>
+              <a:rPr lang="es-CO" sz="4000" dirty="0" smtClean="0">
+                <a:latin typeface="Arial" panose="020B0604020202020204" pitchFamily="34" charset="0"/>
+                <a:cs typeface="Arial" panose="020B0604020202020204" pitchFamily="34" charset="0"/>
+              </a:rPr>
+              <a:t>AMORTIZACIÓN</a:t>
+            </a:r>
+            <a:endParaRPr lang="en-US" sz="4000" dirty="0">
+              <a:latin typeface="Arial" panose="020B0604020202020204" pitchFamily="34" charset="0"/>
+              <a:cs typeface="Arial" panose="020B0604020202020204" pitchFamily="34" charset="0"/>
+            </a:endParaRPr>
+          </a:p>
+        </p:txBody>
+      </p:sp>
+      <p:pic>
+        <p:nvPicPr>
+          <p:cNvPr id="4" name="Imagen 3"/>
+          <p:cNvPicPr>
+            <a:picLocks noChangeAspect="1"/>
+          </p:cNvPicPr>
+          <p:nvPr/>
+        </p:nvPicPr>
+        <p:blipFill>
+          <a:blip r:embed="rId2">
+            <a:extLst>
+              <a:ext uri="{28A0092B-C50C-407E-A947-70E740481C1C}">
+                <a14:useLocalDpi xmlns:a14="http://schemas.microsoft.com/office/drawing/2010/main" val="0"/>
+              </a:ext>
+            </a:extLst>
+          </a:blip>
+          <a:stretch>
+            <a:fillRect/>
+          </a:stretch>
+        </p:blipFill>
+        <p:spPr>
+          <a:xfrm>
+            <a:off x="534321" y="866055"/>
+            <a:ext cx="4095389" cy="3067589"/>
+          </a:xfrm>
+          <a:prstGeom prst="rect">
+            <a:avLst/>
+          </a:prstGeom>
+        </p:spPr>
+      </p:pic>
+    </p:spTree>
+    <p:extLst>
+      <p:ext uri="{BB962C8B-B14F-4D97-AF65-F5344CB8AC3E}">
+        <p14:creationId xmlns:p14="http://schemas.microsoft.com/office/powerpoint/2010/main" val="3601329973"/>
+      </p:ext>
+    </p:extLst>
+  </p:cSld>
+  <p:clrMapOvr>
+    <a:masterClrMapping/>
+  </p:clrMapOvr>
+  <p:timing>
+    <p:tnLst>
+      <p:par>
+        <p:cTn id="1" dur="indefinite" restart="never" nodeType="tmRoot"/>
+      </p:par>
+    </p:tnLst>
+  </p:timing>
 </p:sld>
 </file>
 

</xml_diff>